<commit_message>
move existing slides to old
</commit_message>
<xml_diff>
--- a/ccn/randy_slides/oreilly_ccn_executive.pptx
+++ b/ccn/randy_slides/oreilly_ccn_executive.pptx
@@ -797,7 +797,7 @@
           </a:ln>
           <a:extLst>
             <a:ext uri="{AF507438-7753-43e0-B8FC-AC1667EBCBE1}">
-              <a14:hiddenEffects xmlns:a14="http://schemas.microsoft.com/office/drawing/2010/main" xmlns="">
+              <a14:hiddenEffects xmlns="" xmlns:a14="http://schemas.microsoft.com/office/drawing/2010/main">
                 <a:effectLst>
                   <a:outerShdw blurRad="63500" dist="38099" dir="2700000" algn="ctr" rotWithShape="0">
                     <a:srgbClr val="000000">
@@ -832,14 +832,14 @@
           <a:ln/>
           <a:extLst>
             <a:ext uri="{909E8E84-426E-40dd-AFC4-6F175D3DCCD1}">
-              <a14:hiddenFill xmlns:a14="http://schemas.microsoft.com/office/drawing/2010/main" xmlns="">
+              <a14:hiddenFill xmlns="" xmlns:a14="http://schemas.microsoft.com/office/drawing/2010/main">
                 <a:solidFill>
                   <a:srgbClr val="FFFFFF"/>
                 </a:solidFill>
               </a14:hiddenFill>
             </a:ext>
             <a:ext uri="{91240B29-F687-4f45-9708-019B960494DF}">
-              <a14:hiddenLine xmlns:a14="http://schemas.microsoft.com/office/drawing/2010/main" xmlns="" w="9525">
+              <a14:hiddenLine xmlns="" xmlns:a14="http://schemas.microsoft.com/office/drawing/2010/main" w="9525">
                 <a:solidFill>
                   <a:srgbClr val="000000"/>
                 </a:solidFill>
@@ -849,7 +849,7 @@
               </a14:hiddenLine>
             </a:ext>
             <a:ext uri="{AF507438-7753-43e0-B8FC-AC1667EBCBE1}">
-              <a14:hiddenEffects xmlns:a14="http://schemas.microsoft.com/office/drawing/2010/main" xmlns="">
+              <a14:hiddenEffects xmlns="" xmlns:a14="http://schemas.microsoft.com/office/drawing/2010/main">
                 <a:effectLst>
                   <a:outerShdw blurRad="63500" dist="38099" dir="2700000" algn="ctr" rotWithShape="0">
                     <a:srgbClr val="000000">
@@ -959,7 +959,7 @@
           </a:ln>
           <a:extLst>
             <a:ext uri="{AF507438-7753-43e0-B8FC-AC1667EBCBE1}">
-              <a14:hiddenEffects xmlns:a14="http://schemas.microsoft.com/office/drawing/2010/main" xmlns="">
+              <a14:hiddenEffects xmlns="" xmlns:a14="http://schemas.microsoft.com/office/drawing/2010/main">
                 <a:effectLst>
                   <a:outerShdw blurRad="63500" dist="38099" dir="2700000" algn="ctr" rotWithShape="0">
                     <a:srgbClr val="000000">
@@ -994,14 +994,14 @@
           <a:ln/>
           <a:extLst>
             <a:ext uri="{909E8E84-426E-40dd-AFC4-6F175D3DCCD1}">
-              <a14:hiddenFill xmlns:a14="http://schemas.microsoft.com/office/drawing/2010/main" xmlns="">
+              <a14:hiddenFill xmlns="" xmlns:a14="http://schemas.microsoft.com/office/drawing/2010/main">
                 <a:solidFill>
                   <a:srgbClr val="FFFFFF"/>
                 </a:solidFill>
               </a14:hiddenFill>
             </a:ext>
             <a:ext uri="{91240B29-F687-4f45-9708-019B960494DF}">
-              <a14:hiddenLine xmlns:a14="http://schemas.microsoft.com/office/drawing/2010/main" xmlns="" w="9525">
+              <a14:hiddenLine xmlns="" xmlns:a14="http://schemas.microsoft.com/office/drawing/2010/main" w="9525">
                 <a:solidFill>
                   <a:srgbClr val="000000"/>
                 </a:solidFill>
@@ -1011,7 +1011,7 @@
               </a14:hiddenLine>
             </a:ext>
             <a:ext uri="{AF507438-7753-43e0-B8FC-AC1667EBCBE1}">
-              <a14:hiddenEffects xmlns:a14="http://schemas.microsoft.com/office/drawing/2010/main" xmlns="">
+              <a14:hiddenEffects xmlns="" xmlns:a14="http://schemas.microsoft.com/office/drawing/2010/main">
                 <a:effectLst>
                   <a:outerShdw blurRad="63500" dist="38099" dir="2700000" algn="ctr" rotWithShape="0">
                     <a:srgbClr val="000000">
@@ -1121,7 +1121,7 @@
           </a:ln>
           <a:extLst>
             <a:ext uri="{AF507438-7753-43e0-B8FC-AC1667EBCBE1}">
-              <a14:hiddenEffects xmlns:a14="http://schemas.microsoft.com/office/drawing/2010/main" xmlns="">
+              <a14:hiddenEffects xmlns="" xmlns:a14="http://schemas.microsoft.com/office/drawing/2010/main">
                 <a:effectLst>
                   <a:outerShdw blurRad="63500" dist="38099" dir="2700000" algn="ctr" rotWithShape="0">
                     <a:srgbClr val="000000">
@@ -1156,14 +1156,14 @@
           <a:ln/>
           <a:extLst>
             <a:ext uri="{909E8E84-426E-40dd-AFC4-6F175D3DCCD1}">
-              <a14:hiddenFill xmlns:a14="http://schemas.microsoft.com/office/drawing/2010/main" xmlns="">
+              <a14:hiddenFill xmlns="" xmlns:a14="http://schemas.microsoft.com/office/drawing/2010/main">
                 <a:solidFill>
                   <a:srgbClr val="FFFFFF"/>
                 </a:solidFill>
               </a14:hiddenFill>
             </a:ext>
             <a:ext uri="{91240B29-F687-4f45-9708-019B960494DF}">
-              <a14:hiddenLine xmlns:a14="http://schemas.microsoft.com/office/drawing/2010/main" xmlns="" w="9525">
+              <a14:hiddenLine xmlns="" xmlns:a14="http://schemas.microsoft.com/office/drawing/2010/main" w="9525">
                 <a:solidFill>
                   <a:srgbClr val="000000"/>
                 </a:solidFill>
@@ -1173,7 +1173,7 @@
               </a14:hiddenLine>
             </a:ext>
             <a:ext uri="{AF507438-7753-43e0-B8FC-AC1667EBCBE1}">
-              <a14:hiddenEffects xmlns:a14="http://schemas.microsoft.com/office/drawing/2010/main" xmlns="">
+              <a14:hiddenEffects xmlns="" xmlns:a14="http://schemas.microsoft.com/office/drawing/2010/main">
                 <a:effectLst>
                   <a:outerShdw blurRad="63500" dist="38099" dir="2700000" algn="ctr" rotWithShape="0">
                     <a:srgbClr val="000000">
@@ -1283,7 +1283,7 @@
           </a:ln>
           <a:extLst>
             <a:ext uri="{AF507438-7753-43e0-B8FC-AC1667EBCBE1}">
-              <a14:hiddenEffects xmlns:a14="http://schemas.microsoft.com/office/drawing/2010/main" xmlns="">
+              <a14:hiddenEffects xmlns="" xmlns:a14="http://schemas.microsoft.com/office/drawing/2010/main">
                 <a:effectLst>
                   <a:outerShdw blurRad="63500" dist="38099" dir="2700000" algn="ctr" rotWithShape="0">
                     <a:srgbClr val="000000">
@@ -1318,14 +1318,14 @@
           <a:ln/>
           <a:extLst>
             <a:ext uri="{909E8E84-426E-40dd-AFC4-6F175D3DCCD1}">
-              <a14:hiddenFill xmlns:a14="http://schemas.microsoft.com/office/drawing/2010/main" xmlns="">
+              <a14:hiddenFill xmlns="" xmlns:a14="http://schemas.microsoft.com/office/drawing/2010/main">
                 <a:solidFill>
                   <a:srgbClr val="FFFFFF"/>
                 </a:solidFill>
               </a14:hiddenFill>
             </a:ext>
             <a:ext uri="{91240B29-F687-4f45-9708-019B960494DF}">
-              <a14:hiddenLine xmlns:a14="http://schemas.microsoft.com/office/drawing/2010/main" xmlns="" w="9525">
+              <a14:hiddenLine xmlns="" xmlns:a14="http://schemas.microsoft.com/office/drawing/2010/main" w="9525">
                 <a:solidFill>
                   <a:srgbClr val="000000"/>
                 </a:solidFill>
@@ -1335,7 +1335,7 @@
               </a14:hiddenLine>
             </a:ext>
             <a:ext uri="{AF507438-7753-43e0-B8FC-AC1667EBCBE1}">
-              <a14:hiddenEffects xmlns:a14="http://schemas.microsoft.com/office/drawing/2010/main" xmlns="">
+              <a14:hiddenEffects xmlns="" xmlns:a14="http://schemas.microsoft.com/office/drawing/2010/main">
                 <a:effectLst>
                   <a:outerShdw blurRad="63500" dist="38099" dir="2700000" algn="ctr" rotWithShape="0">
                     <a:srgbClr val="000000">
@@ -6299,7 +6299,7 @@
           <a:effectLst/>
           <a:extLst>
             <a:ext uri="{909E8E84-426E-40dd-AFC4-6F175D3DCCD1}">
-              <a14:hiddenFill xmlns:a14="http://schemas.microsoft.com/office/drawing/2010/main" xmlns="">
+              <a14:hiddenFill xmlns="" xmlns:a14="http://schemas.microsoft.com/office/drawing/2010/main">
                 <a:blipFill dpi="0" rotWithShape="0">
                   <a:blip/>
                   <a:srcRect/>
@@ -6310,7 +6310,7 @@
               </a14:hiddenFill>
             </a:ext>
             <a:ext uri="{91240B29-F687-4f45-9708-019B960494DF}">
-              <a14:hiddenLine xmlns:a14="http://schemas.microsoft.com/office/drawing/2010/main" xmlns="" w="9525">
+              <a14:hiddenLine xmlns="" xmlns:a14="http://schemas.microsoft.com/office/drawing/2010/main" w="9525">
                 <a:solidFill>
                   <a:srgbClr val="000000"/>
                 </a:solidFill>
@@ -6320,7 +6320,7 @@
               </a14:hiddenLine>
             </a:ext>
             <a:ext uri="{AF507438-7753-43e0-B8FC-AC1667EBCBE1}">
-              <a14:hiddenEffects xmlns:a14="http://schemas.microsoft.com/office/drawing/2010/main" xmlns="">
+              <a14:hiddenEffects xmlns="" xmlns:a14="http://schemas.microsoft.com/office/drawing/2010/main">
                 <a:effectLst>
                   <a:outerShdw blurRad="63500" dist="38099" dir="2700000" algn="ctr" rotWithShape="0">
                     <a:srgbClr val="000000">
@@ -6449,7 +6449,7 @@
           <a:effectLst/>
           <a:extLst>
             <a:ext uri="{909E8E84-426E-40dd-AFC4-6F175D3DCCD1}">
-              <a14:hiddenFill xmlns:a14="http://schemas.microsoft.com/office/drawing/2010/main" xmlns="">
+              <a14:hiddenFill xmlns="" xmlns:a14="http://schemas.microsoft.com/office/drawing/2010/main">
                 <a:blipFill dpi="0" rotWithShape="0">
                   <a:blip/>
                   <a:srcRect/>
@@ -6460,7 +6460,7 @@
               </a14:hiddenFill>
             </a:ext>
             <a:ext uri="{91240B29-F687-4f45-9708-019B960494DF}">
-              <a14:hiddenLine xmlns:a14="http://schemas.microsoft.com/office/drawing/2010/main" xmlns="" w="9525">
+              <a14:hiddenLine xmlns="" xmlns:a14="http://schemas.microsoft.com/office/drawing/2010/main" w="9525">
                 <a:solidFill>
                   <a:srgbClr val="000000"/>
                 </a:solidFill>
@@ -6470,7 +6470,7 @@
               </a14:hiddenLine>
             </a:ext>
             <a:ext uri="{AF507438-7753-43e0-B8FC-AC1667EBCBE1}">
-              <a14:hiddenEffects xmlns:a14="http://schemas.microsoft.com/office/drawing/2010/main" xmlns="">
+              <a14:hiddenEffects xmlns="" xmlns:a14="http://schemas.microsoft.com/office/drawing/2010/main">
                 <a:effectLst>
                   <a:outerShdw blurRad="63500" dist="38099" dir="2700000" algn="ctr" rotWithShape="0">
                     <a:srgbClr val="000000">
@@ -7435,7 +7435,7 @@
       </p:sp>
       <p:pic>
         <p:nvPicPr>
-          <p:cNvPr id="4" name="Content Placeholder 3" descr="fig_pfc_trc_reverb_loops.png"/>
+          <p:cNvPr id="4" name="Content Placeholder 3"/>
           <p:cNvPicPr>
             <a:picLocks noGrp="1" noChangeAspect="1"/>
           </p:cNvPicPr>
@@ -7444,19 +7444,16 @@
           </p:nvPr>
         </p:nvPicPr>
         <p:blipFill>
-          <a:blip r:embed="rId2">
-            <a:extLst>
-              <a:ext uri="{28A0092B-C50C-407E-A947-70E740481C1C}">
-                <a14:useLocalDpi xmlns:a14="http://schemas.microsoft.com/office/drawing/2010/main" val="0"/>
-              </a:ext>
-            </a:extLst>
-          </a:blip>
-          <a:srcRect l="-22482" r="-22482"/>
-          <a:stretch>
-            <a:fillRect/>
-          </a:stretch>
+          <a:blip r:embed="rId2"/>
+          <a:srcRect/>
+          <a:stretch/>
         </p:blipFill>
-        <p:spPr/>
+        <p:spPr>
+          <a:xfrm>
+            <a:off x="1992360" y="1770066"/>
+            <a:ext cx="6089563" cy="4989513"/>
+          </a:xfrm>
+        </p:spPr>
       </p:pic>
     </p:spTree>
     <p:extLst>
@@ -7613,7 +7610,7 @@
           <a:effectLst/>
           <a:extLst>
             <a:ext uri="{909E8E84-426E-40dd-AFC4-6F175D3DCCD1}">
-              <a14:hiddenFill xmlns:a14="http://schemas.microsoft.com/office/drawing/2010/main" xmlns="">
+              <a14:hiddenFill xmlns="" xmlns:a14="http://schemas.microsoft.com/office/drawing/2010/main">
                 <a:blipFill dpi="0" rotWithShape="0">
                   <a:blip/>
                   <a:srcRect/>
@@ -7624,7 +7621,7 @@
               </a14:hiddenFill>
             </a:ext>
             <a:ext uri="{91240B29-F687-4f45-9708-019B960494DF}">
-              <a14:hiddenLine xmlns:a14="http://schemas.microsoft.com/office/drawing/2010/main" xmlns="" w="9525">
+              <a14:hiddenLine xmlns="" xmlns:a14="http://schemas.microsoft.com/office/drawing/2010/main" w="9525">
                 <a:solidFill>
                   <a:srgbClr val="000000"/>
                 </a:solidFill>
@@ -7634,7 +7631,7 @@
               </a14:hiddenLine>
             </a:ext>
             <a:ext uri="{AF507438-7753-43e0-B8FC-AC1667EBCBE1}">
-              <a14:hiddenEffects xmlns:a14="http://schemas.microsoft.com/office/drawing/2010/main" xmlns="">
+              <a14:hiddenEffects xmlns="" xmlns:a14="http://schemas.microsoft.com/office/drawing/2010/main">
                 <a:effectLst>
                   <a:outerShdw blurRad="63500" dist="38099" dir="2700000" algn="ctr" rotWithShape="0">
                     <a:srgbClr val="000000">
@@ -7675,12 +7672,12 @@
           <a:effectLst/>
           <a:extLst>
             <a:ext uri="{909E8E84-426E-40dd-AFC4-6F175D3DCCD1}">
-              <a14:hiddenFill xmlns:a14="http://schemas.microsoft.com/office/drawing/2010/main" xmlns="">
+              <a14:hiddenFill xmlns="" xmlns:a14="http://schemas.microsoft.com/office/drawing/2010/main">
                 <a:noFill/>
               </a14:hiddenFill>
             </a:ext>
             <a:ext uri="{AF507438-7753-43e0-B8FC-AC1667EBCBE1}">
-              <a14:hiddenEffects xmlns:a14="http://schemas.microsoft.com/office/drawing/2010/main" xmlns="">
+              <a14:hiddenEffects xmlns="" xmlns:a14="http://schemas.microsoft.com/office/drawing/2010/main">
                 <a:effectLst>
                   <a:outerShdw blurRad="63500" dist="38099" dir="2700000" algn="ctr" rotWithShape="0">
                     <a:srgbClr val="000000">
@@ -7736,7 +7733,7 @@
           <a:effectLst/>
           <a:extLst>
             <a:ext uri="{909E8E84-426E-40dd-AFC4-6F175D3DCCD1}">
-              <a14:hiddenFill xmlns:a14="http://schemas.microsoft.com/office/drawing/2010/main" xmlns="">
+              <a14:hiddenFill xmlns="" xmlns:a14="http://schemas.microsoft.com/office/drawing/2010/main">
                 <a:blipFill dpi="0" rotWithShape="0">
                   <a:blip/>
                   <a:srcRect/>
@@ -7747,7 +7744,7 @@
               </a14:hiddenFill>
             </a:ext>
             <a:ext uri="{91240B29-F687-4f45-9708-019B960494DF}">
-              <a14:hiddenLine xmlns:a14="http://schemas.microsoft.com/office/drawing/2010/main" xmlns="" w="9525">
+              <a14:hiddenLine xmlns="" xmlns:a14="http://schemas.microsoft.com/office/drawing/2010/main" w="9525">
                 <a:solidFill>
                   <a:srgbClr val="000000"/>
                 </a:solidFill>
@@ -7757,7 +7754,7 @@
               </a14:hiddenLine>
             </a:ext>
             <a:ext uri="{AF507438-7753-43e0-B8FC-AC1667EBCBE1}">
-              <a14:hiddenEffects xmlns:a14="http://schemas.microsoft.com/office/drawing/2010/main" xmlns="">
+              <a14:hiddenEffects xmlns="" xmlns:a14="http://schemas.microsoft.com/office/drawing/2010/main">
                 <a:effectLst>
                   <a:outerShdw blurRad="63500" dist="38099" dir="2700000" algn="ctr" rotWithShape="0">
                     <a:srgbClr val="000000">
@@ -7908,7 +7905,7 @@
           <a:effectLst/>
           <a:extLst>
             <a:ext uri="{909E8E84-426E-40dd-AFC4-6F175D3DCCD1}">
-              <a14:hiddenFill xmlns:a14="http://schemas.microsoft.com/office/drawing/2010/main" xmlns="">
+              <a14:hiddenFill xmlns="" xmlns:a14="http://schemas.microsoft.com/office/drawing/2010/main">
                 <a:blipFill dpi="0" rotWithShape="0">
                   <a:blip/>
                   <a:srcRect/>
@@ -7919,7 +7916,7 @@
               </a14:hiddenFill>
             </a:ext>
             <a:ext uri="{91240B29-F687-4f45-9708-019B960494DF}">
-              <a14:hiddenLine xmlns:a14="http://schemas.microsoft.com/office/drawing/2010/main" xmlns="" w="9525">
+              <a14:hiddenLine xmlns="" xmlns:a14="http://schemas.microsoft.com/office/drawing/2010/main" w="9525">
                 <a:solidFill>
                   <a:srgbClr val="000000"/>
                 </a:solidFill>
@@ -7929,7 +7926,7 @@
               </a14:hiddenLine>
             </a:ext>
             <a:ext uri="{AF507438-7753-43e0-B8FC-AC1667EBCBE1}">
-              <a14:hiddenEffects xmlns:a14="http://schemas.microsoft.com/office/drawing/2010/main" xmlns="">
+              <a14:hiddenEffects xmlns="" xmlns:a14="http://schemas.microsoft.com/office/drawing/2010/main">
                 <a:effectLst>
                   <a:outerShdw blurRad="63500" dist="38099" dir="2700000" algn="ctr" rotWithShape="0">
                     <a:srgbClr val="000000">
@@ -8058,7 +8055,7 @@
           <a:effectLst/>
           <a:extLst>
             <a:ext uri="{909E8E84-426E-40dd-AFC4-6F175D3DCCD1}">
-              <a14:hiddenFill xmlns:a14="http://schemas.microsoft.com/office/drawing/2010/main" xmlns="">
+              <a14:hiddenFill xmlns="" xmlns:a14="http://schemas.microsoft.com/office/drawing/2010/main">
                 <a:blipFill dpi="0" rotWithShape="0">
                   <a:blip/>
                   <a:srcRect/>
@@ -8069,7 +8066,7 @@
               </a14:hiddenFill>
             </a:ext>
             <a:ext uri="{91240B29-F687-4f45-9708-019B960494DF}">
-              <a14:hiddenLine xmlns:a14="http://schemas.microsoft.com/office/drawing/2010/main" xmlns="" w="9525">
+              <a14:hiddenLine xmlns="" xmlns:a14="http://schemas.microsoft.com/office/drawing/2010/main" w="9525">
                 <a:solidFill>
                   <a:srgbClr val="000000"/>
                 </a:solidFill>
@@ -8079,7 +8076,7 @@
               </a14:hiddenLine>
             </a:ext>
             <a:ext uri="{AF507438-7753-43e0-B8FC-AC1667EBCBE1}">
-              <a14:hiddenEffects xmlns:a14="http://schemas.microsoft.com/office/drawing/2010/main" xmlns="">
+              <a14:hiddenEffects xmlns="" xmlns:a14="http://schemas.microsoft.com/office/drawing/2010/main">
                 <a:effectLst>
                   <a:outerShdw blurRad="63500" dist="38099" dir="2700000" algn="ctr" rotWithShape="0">
                     <a:srgbClr val="000000">

</xml_diff>